<commit_message>
Code smells and SOLID Design Principles presentations final cut
</commit_message>
<xml_diff>
--- a/presentations/Code Smells.pptx
+++ b/presentations/Code Smells.pptx
@@ -267,7 +267,7 @@
           <a:p>
             <a:fld id="{175F8C70-9BAA-134C-A16E-4EFB2EC8BBB9}" type="datetimeFigureOut">
               <a:rPr lang="en-US" smtClean="0"/>
-              <a:t>7/26/21</a:t>
+              <a:t>8/3/21</a:t>
             </a:fld>
             <a:endParaRPr lang="en-US"/>
           </a:p>
@@ -337,6 +337,18 @@
   <p:clrMapOvr>
     <a:masterClrMapping/>
   </p:clrMapOvr>
+  <mc:AlternateContent xmlns:mc="http://schemas.openxmlformats.org/markup-compatibility/2006">
+    <mc:Choice xmlns:p14="http://schemas.microsoft.com/office/powerpoint/2010/main" Requires="p14">
+      <p:transition spd="med" p14:dur="700">
+        <p:fade/>
+      </p:transition>
+    </mc:Choice>
+    <mc:Fallback>
+      <p:transition spd="med">
+        <p:fade/>
+      </p:transition>
+    </mc:Fallback>
+  </mc:AlternateContent>
 </p:sldLayout>
 </file>
 
@@ -465,7 +477,7 @@
           <a:p>
             <a:fld id="{175F8C70-9BAA-134C-A16E-4EFB2EC8BBB9}" type="datetimeFigureOut">
               <a:rPr lang="en-US" smtClean="0"/>
-              <a:t>7/26/21</a:t>
+              <a:t>8/3/21</a:t>
             </a:fld>
             <a:endParaRPr lang="en-US"/>
           </a:p>
@@ -535,6 +547,18 @@
   <p:clrMapOvr>
     <a:masterClrMapping/>
   </p:clrMapOvr>
+  <mc:AlternateContent xmlns:mc="http://schemas.openxmlformats.org/markup-compatibility/2006">
+    <mc:Choice xmlns:p14="http://schemas.microsoft.com/office/powerpoint/2010/main" Requires="p14">
+      <p:transition spd="med" p14:dur="700">
+        <p:fade/>
+      </p:transition>
+    </mc:Choice>
+    <mc:Fallback>
+      <p:transition spd="med">
+        <p:fade/>
+      </p:transition>
+    </mc:Fallback>
+  </mc:AlternateContent>
 </p:sldLayout>
 </file>
 
@@ -673,7 +697,7 @@
           <a:p>
             <a:fld id="{175F8C70-9BAA-134C-A16E-4EFB2EC8BBB9}" type="datetimeFigureOut">
               <a:rPr lang="en-US" smtClean="0"/>
-              <a:t>7/26/21</a:t>
+              <a:t>8/3/21</a:t>
             </a:fld>
             <a:endParaRPr lang="en-US"/>
           </a:p>
@@ -743,6 +767,18 @@
   <p:clrMapOvr>
     <a:masterClrMapping/>
   </p:clrMapOvr>
+  <mc:AlternateContent xmlns:mc="http://schemas.openxmlformats.org/markup-compatibility/2006">
+    <mc:Choice xmlns:p14="http://schemas.microsoft.com/office/powerpoint/2010/main" Requires="p14">
+      <p:transition spd="med" p14:dur="700">
+        <p:fade/>
+      </p:transition>
+    </mc:Choice>
+    <mc:Fallback>
+      <p:transition spd="med">
+        <p:fade/>
+      </p:transition>
+    </mc:Fallback>
+  </mc:AlternateContent>
 </p:sldLayout>
 </file>
 
@@ -871,7 +907,7 @@
           <a:p>
             <a:fld id="{175F8C70-9BAA-134C-A16E-4EFB2EC8BBB9}" type="datetimeFigureOut">
               <a:rPr lang="en-US" smtClean="0"/>
-              <a:t>7/26/21</a:t>
+              <a:t>8/3/21</a:t>
             </a:fld>
             <a:endParaRPr lang="en-US"/>
           </a:p>
@@ -941,6 +977,18 @@
   <p:clrMapOvr>
     <a:masterClrMapping/>
   </p:clrMapOvr>
+  <mc:AlternateContent xmlns:mc="http://schemas.openxmlformats.org/markup-compatibility/2006">
+    <mc:Choice xmlns:p14="http://schemas.microsoft.com/office/powerpoint/2010/main" Requires="p14">
+      <p:transition spd="med" p14:dur="700">
+        <p:fade/>
+      </p:transition>
+    </mc:Choice>
+    <mc:Fallback>
+      <p:transition spd="med">
+        <p:fade/>
+      </p:transition>
+    </mc:Fallback>
+  </mc:AlternateContent>
 </p:sldLayout>
 </file>
 
@@ -1146,7 +1194,7 @@
           <a:p>
             <a:fld id="{175F8C70-9BAA-134C-A16E-4EFB2EC8BBB9}" type="datetimeFigureOut">
               <a:rPr lang="en-US" smtClean="0"/>
-              <a:t>7/26/21</a:t>
+              <a:t>8/3/21</a:t>
             </a:fld>
             <a:endParaRPr lang="en-US"/>
           </a:p>
@@ -1216,6 +1264,18 @@
   <p:clrMapOvr>
     <a:masterClrMapping/>
   </p:clrMapOvr>
+  <mc:AlternateContent xmlns:mc="http://schemas.openxmlformats.org/markup-compatibility/2006">
+    <mc:Choice xmlns:p14="http://schemas.microsoft.com/office/powerpoint/2010/main" Requires="p14">
+      <p:transition spd="med" p14:dur="700">
+        <p:fade/>
+      </p:transition>
+    </mc:Choice>
+    <mc:Fallback>
+      <p:transition spd="med">
+        <p:fade/>
+      </p:transition>
+    </mc:Fallback>
+  </mc:AlternateContent>
 </p:sldLayout>
 </file>
 
@@ -1411,7 +1471,7 @@
           <a:p>
             <a:fld id="{175F8C70-9BAA-134C-A16E-4EFB2EC8BBB9}" type="datetimeFigureOut">
               <a:rPr lang="en-US" smtClean="0"/>
-              <a:t>7/26/21</a:t>
+              <a:t>8/3/21</a:t>
             </a:fld>
             <a:endParaRPr lang="en-US"/>
           </a:p>
@@ -1481,6 +1541,18 @@
   <p:clrMapOvr>
     <a:masterClrMapping/>
   </p:clrMapOvr>
+  <mc:AlternateContent xmlns:mc="http://schemas.openxmlformats.org/markup-compatibility/2006">
+    <mc:Choice xmlns:p14="http://schemas.microsoft.com/office/powerpoint/2010/main" Requires="p14">
+      <p:transition spd="med" p14:dur="700">
+        <p:fade/>
+      </p:transition>
+    </mc:Choice>
+    <mc:Fallback>
+      <p:transition spd="med">
+        <p:fade/>
+      </p:transition>
+    </mc:Fallback>
+  </mc:AlternateContent>
 </p:sldLayout>
 </file>
 
@@ -1823,7 +1895,7 @@
           <a:p>
             <a:fld id="{175F8C70-9BAA-134C-A16E-4EFB2EC8BBB9}" type="datetimeFigureOut">
               <a:rPr lang="en-US" smtClean="0"/>
-              <a:t>7/26/21</a:t>
+              <a:t>8/3/21</a:t>
             </a:fld>
             <a:endParaRPr lang="en-US"/>
           </a:p>
@@ -1893,6 +1965,18 @@
   <p:clrMapOvr>
     <a:masterClrMapping/>
   </p:clrMapOvr>
+  <mc:AlternateContent xmlns:mc="http://schemas.openxmlformats.org/markup-compatibility/2006">
+    <mc:Choice xmlns:p14="http://schemas.microsoft.com/office/powerpoint/2010/main" Requires="p14">
+      <p:transition spd="med" p14:dur="700">
+        <p:fade/>
+      </p:transition>
+    </mc:Choice>
+    <mc:Fallback>
+      <p:transition spd="med">
+        <p:fade/>
+      </p:transition>
+    </mc:Fallback>
+  </mc:AlternateContent>
 </p:sldLayout>
 </file>
 
@@ -1964,7 +2048,7 @@
           <a:p>
             <a:fld id="{175F8C70-9BAA-134C-A16E-4EFB2EC8BBB9}" type="datetimeFigureOut">
               <a:rPr lang="en-US" smtClean="0"/>
-              <a:t>7/26/21</a:t>
+              <a:t>8/3/21</a:t>
             </a:fld>
             <a:endParaRPr lang="en-US"/>
           </a:p>
@@ -2034,6 +2118,18 @@
   <p:clrMapOvr>
     <a:masterClrMapping/>
   </p:clrMapOvr>
+  <mc:AlternateContent xmlns:mc="http://schemas.openxmlformats.org/markup-compatibility/2006">
+    <mc:Choice xmlns:p14="http://schemas.microsoft.com/office/powerpoint/2010/main" Requires="p14">
+      <p:transition spd="med" p14:dur="700">
+        <p:fade/>
+      </p:transition>
+    </mc:Choice>
+    <mc:Fallback>
+      <p:transition spd="med">
+        <p:fade/>
+      </p:transition>
+    </mc:Fallback>
+  </mc:AlternateContent>
 </p:sldLayout>
 </file>
 
@@ -2077,7 +2173,7 @@
           <a:p>
             <a:fld id="{175F8C70-9BAA-134C-A16E-4EFB2EC8BBB9}" type="datetimeFigureOut">
               <a:rPr lang="en-US" smtClean="0"/>
-              <a:t>7/26/21</a:t>
+              <a:t>8/3/21</a:t>
             </a:fld>
             <a:endParaRPr lang="en-US"/>
           </a:p>
@@ -2147,6 +2243,18 @@
   <p:clrMapOvr>
     <a:masterClrMapping/>
   </p:clrMapOvr>
+  <mc:AlternateContent xmlns:mc="http://schemas.openxmlformats.org/markup-compatibility/2006">
+    <mc:Choice xmlns:p14="http://schemas.microsoft.com/office/powerpoint/2010/main" Requires="p14">
+      <p:transition spd="med" p14:dur="700">
+        <p:fade/>
+      </p:transition>
+    </mc:Choice>
+    <mc:Fallback>
+      <p:transition spd="med">
+        <p:fade/>
+      </p:transition>
+    </mc:Fallback>
+  </mc:AlternateContent>
 </p:sldLayout>
 </file>
 
@@ -2388,7 +2496,7 @@
           <a:p>
             <a:fld id="{175F8C70-9BAA-134C-A16E-4EFB2EC8BBB9}" type="datetimeFigureOut">
               <a:rPr lang="en-US" smtClean="0"/>
-              <a:t>7/26/21</a:t>
+              <a:t>8/3/21</a:t>
             </a:fld>
             <a:endParaRPr lang="en-US"/>
           </a:p>
@@ -2458,6 +2566,18 @@
   <p:clrMapOvr>
     <a:masterClrMapping/>
   </p:clrMapOvr>
+  <mc:AlternateContent xmlns:mc="http://schemas.openxmlformats.org/markup-compatibility/2006">
+    <mc:Choice xmlns:p14="http://schemas.microsoft.com/office/powerpoint/2010/main" Requires="p14">
+      <p:transition spd="med" p14:dur="700">
+        <p:fade/>
+      </p:transition>
+    </mc:Choice>
+    <mc:Fallback>
+      <p:transition spd="med">
+        <p:fade/>
+      </p:transition>
+    </mc:Fallback>
+  </mc:AlternateContent>
 </p:sldLayout>
 </file>
 
@@ -2676,7 +2796,7 @@
           <a:p>
             <a:fld id="{175F8C70-9BAA-134C-A16E-4EFB2EC8BBB9}" type="datetimeFigureOut">
               <a:rPr lang="en-US" smtClean="0"/>
-              <a:t>7/26/21</a:t>
+              <a:t>8/3/21</a:t>
             </a:fld>
             <a:endParaRPr lang="en-US"/>
           </a:p>
@@ -2746,6 +2866,18 @@
   <p:clrMapOvr>
     <a:masterClrMapping/>
   </p:clrMapOvr>
+  <mc:AlternateContent xmlns:mc="http://schemas.openxmlformats.org/markup-compatibility/2006">
+    <mc:Choice xmlns:p14="http://schemas.microsoft.com/office/powerpoint/2010/main" Requires="p14">
+      <p:transition spd="med" p14:dur="700">
+        <p:fade/>
+      </p:transition>
+    </mc:Choice>
+    <mc:Fallback>
+      <p:transition spd="med">
+        <p:fade/>
+      </p:transition>
+    </mc:Fallback>
+  </mc:AlternateContent>
 </p:sldLayout>
 </file>
 
@@ -2917,7 +3049,7 @@
           <a:p>
             <a:fld id="{175F8C70-9BAA-134C-A16E-4EFB2EC8BBB9}" type="datetimeFigureOut">
               <a:rPr lang="en-US" smtClean="0"/>
-              <a:t>7/26/21</a:t>
+              <a:t>8/3/21</a:t>
             </a:fld>
             <a:endParaRPr lang="en-US"/>
           </a:p>
@@ -3034,6 +3166,18 @@
     <p:sldLayoutId id="2147483658" r:id="rId10"/>
     <p:sldLayoutId id="2147483659" r:id="rId11"/>
   </p:sldLayoutIdLst>
+  <mc:AlternateContent xmlns:mc="http://schemas.openxmlformats.org/markup-compatibility/2006">
+    <mc:Choice xmlns:p14="http://schemas.microsoft.com/office/powerpoint/2010/main" Requires="p14">
+      <p:transition spd="med" p14:dur="700">
+        <p:fade/>
+      </p:transition>
+    </mc:Choice>
+    <mc:Fallback>
+      <p:transition spd="med">
+        <p:fade/>
+      </p:transition>
+    </mc:Fallback>
+  </mc:AlternateContent>
   <p:txStyles>
     <p:titleStyle>
       <a:lvl1pPr algn="l" defTabSz="914400" rtl="0" eaLnBrk="1" latinLnBrk="0" hangingPunct="1">
@@ -3400,6 +3544,18 @@
   <p:clrMapOvr>
     <a:masterClrMapping/>
   </p:clrMapOvr>
+  <mc:AlternateContent xmlns:mc="http://schemas.openxmlformats.org/markup-compatibility/2006">
+    <mc:Choice xmlns:p14="http://schemas.microsoft.com/office/powerpoint/2010/main" Requires="p14">
+      <p:transition spd="med" p14:dur="700">
+        <p:fade/>
+      </p:transition>
+    </mc:Choice>
+    <mc:Fallback>
+      <p:transition spd="med">
+        <p:fade/>
+      </p:transition>
+    </mc:Fallback>
+  </mc:AlternateContent>
 </p:sld>
 </file>
 
@@ -3442,10 +3598,9 @@
           <a:lstStyle/>
           <a:p>
             <a:r>
-              <a:rPr lang="en-US" b="1" dirty="0"/>
+              <a:rPr lang="en-US" dirty="0"/>
               <a:t>Code smells</a:t>
             </a:r>
-            <a:endParaRPr lang="en-US" dirty="0"/>
           </a:p>
         </p:txBody>
       </p:sp>
@@ -3502,6 +3657,198 @@
   <p:clrMapOvr>
     <a:masterClrMapping/>
   </p:clrMapOvr>
+  <mc:AlternateContent xmlns:mc="http://schemas.openxmlformats.org/markup-compatibility/2006">
+    <mc:Choice xmlns:p14="http://schemas.microsoft.com/office/powerpoint/2010/main" Requires="p14">
+      <p:transition spd="med" p14:dur="700">
+        <p:fade/>
+      </p:transition>
+    </mc:Choice>
+    <mc:Fallback>
+      <p:transition spd="med">
+        <p:fade/>
+      </p:transition>
+    </mc:Fallback>
+  </mc:AlternateContent>
+  <p:timing>
+    <p:tnLst>
+      <p:par>
+        <p:cTn id="1" dur="indefinite" restart="never" nodeType="tmRoot">
+          <p:childTnLst>
+            <p:seq concurrent="1" nextAc="seek">
+              <p:cTn id="2" dur="indefinite" nodeType="mainSeq">
+                <p:childTnLst>
+                  <p:par>
+                    <p:cTn id="3" fill="hold">
+                      <p:stCondLst>
+                        <p:cond delay="indefinite"/>
+                      </p:stCondLst>
+                      <p:childTnLst>
+                        <p:par>
+                          <p:cTn id="4" fill="hold">
+                            <p:stCondLst>
+                              <p:cond delay="0"/>
+                            </p:stCondLst>
+                            <p:childTnLst>
+                              <p:par>
+                                <p:cTn id="5" presetID="1" presetClass="entr" presetSubtype="0" fill="hold" grpId="0" nodeType="clickEffect">
+                                  <p:stCondLst>
+                                    <p:cond delay="0"/>
+                                  </p:stCondLst>
+                                  <p:childTnLst>
+                                    <p:set>
+                                      <p:cBhvr>
+                                        <p:cTn id="6" dur="1" fill="hold">
+                                          <p:stCondLst>
+                                            <p:cond delay="0"/>
+                                          </p:stCondLst>
+                                        </p:cTn>
+                                        <p:tgtEl>
+                                          <p:spTgt spid="3">
+                                            <p:txEl>
+                                              <p:pRg st="0" end="0"/>
+                                            </p:txEl>
+                                          </p:spTgt>
+                                        </p:tgtEl>
+                                        <p:attrNameLst>
+                                          <p:attrName>style.visibility</p:attrName>
+                                        </p:attrNameLst>
+                                      </p:cBhvr>
+                                      <p:to>
+                                        <p:strVal val="visible"/>
+                                      </p:to>
+                                    </p:set>
+                                  </p:childTnLst>
+                                </p:cTn>
+                              </p:par>
+                            </p:childTnLst>
+                          </p:cTn>
+                        </p:par>
+                      </p:childTnLst>
+                    </p:cTn>
+                  </p:par>
+                  <p:par>
+                    <p:cTn id="7" fill="hold">
+                      <p:stCondLst>
+                        <p:cond delay="indefinite"/>
+                      </p:stCondLst>
+                      <p:childTnLst>
+                        <p:par>
+                          <p:cTn id="8" fill="hold">
+                            <p:stCondLst>
+                              <p:cond delay="0"/>
+                            </p:stCondLst>
+                            <p:childTnLst>
+                              <p:par>
+                                <p:cTn id="9" presetID="1" presetClass="entr" presetSubtype="0" fill="hold" grpId="0" nodeType="clickEffect">
+                                  <p:stCondLst>
+                                    <p:cond delay="0"/>
+                                  </p:stCondLst>
+                                  <p:childTnLst>
+                                    <p:set>
+                                      <p:cBhvr>
+                                        <p:cTn id="10" dur="1" fill="hold">
+                                          <p:stCondLst>
+                                            <p:cond delay="0"/>
+                                          </p:stCondLst>
+                                        </p:cTn>
+                                        <p:tgtEl>
+                                          <p:spTgt spid="3">
+                                            <p:txEl>
+                                              <p:pRg st="1" end="1"/>
+                                            </p:txEl>
+                                          </p:spTgt>
+                                        </p:tgtEl>
+                                        <p:attrNameLst>
+                                          <p:attrName>style.visibility</p:attrName>
+                                        </p:attrNameLst>
+                                      </p:cBhvr>
+                                      <p:to>
+                                        <p:strVal val="visible"/>
+                                      </p:to>
+                                    </p:set>
+                                  </p:childTnLst>
+                                </p:cTn>
+                              </p:par>
+                            </p:childTnLst>
+                          </p:cTn>
+                        </p:par>
+                      </p:childTnLst>
+                    </p:cTn>
+                  </p:par>
+                  <p:par>
+                    <p:cTn id="11" fill="hold">
+                      <p:stCondLst>
+                        <p:cond delay="indefinite"/>
+                      </p:stCondLst>
+                      <p:childTnLst>
+                        <p:par>
+                          <p:cTn id="12" fill="hold">
+                            <p:stCondLst>
+                              <p:cond delay="0"/>
+                            </p:stCondLst>
+                            <p:childTnLst>
+                              <p:par>
+                                <p:cTn id="13" presetID="1" presetClass="entr" presetSubtype="0" fill="hold" grpId="0" nodeType="clickEffect">
+                                  <p:stCondLst>
+                                    <p:cond delay="0"/>
+                                  </p:stCondLst>
+                                  <p:childTnLst>
+                                    <p:set>
+                                      <p:cBhvr>
+                                        <p:cTn id="14" dur="1" fill="hold">
+                                          <p:stCondLst>
+                                            <p:cond delay="0"/>
+                                          </p:stCondLst>
+                                        </p:cTn>
+                                        <p:tgtEl>
+                                          <p:spTgt spid="3">
+                                            <p:txEl>
+                                              <p:pRg st="2" end="2"/>
+                                            </p:txEl>
+                                          </p:spTgt>
+                                        </p:tgtEl>
+                                        <p:attrNameLst>
+                                          <p:attrName>style.visibility</p:attrName>
+                                        </p:attrNameLst>
+                                      </p:cBhvr>
+                                      <p:to>
+                                        <p:strVal val="visible"/>
+                                      </p:to>
+                                    </p:set>
+                                  </p:childTnLst>
+                                </p:cTn>
+                              </p:par>
+                            </p:childTnLst>
+                          </p:cTn>
+                        </p:par>
+                      </p:childTnLst>
+                    </p:cTn>
+                  </p:par>
+                </p:childTnLst>
+              </p:cTn>
+              <p:prevCondLst>
+                <p:cond evt="onPrev" delay="0">
+                  <p:tgtEl>
+                    <p:sldTgt/>
+                  </p:tgtEl>
+                </p:cond>
+              </p:prevCondLst>
+              <p:nextCondLst>
+                <p:cond evt="onNext" delay="0">
+                  <p:tgtEl>
+                    <p:sldTgt/>
+                  </p:tgtEl>
+                </p:cond>
+              </p:nextCondLst>
+            </p:seq>
+          </p:childTnLst>
+        </p:cTn>
+      </p:par>
+    </p:tnLst>
+    <p:bldLst>
+      <p:bldP spid="3" grpId="0" build="p"/>
+    </p:bldLst>
+  </p:timing>
 </p:sld>
 </file>
 
@@ -3544,10 +3891,9 @@
           <a:lstStyle/>
           <a:p>
             <a:r>
-              <a:rPr lang="en-US" b="1" dirty="0"/>
+              <a:rPr lang="en-US" dirty="0"/>
               <a:t>Code smell examples: Application level</a:t>
             </a:r>
-            <a:endParaRPr lang="en-US" dirty="0"/>
           </a:p>
         </p:txBody>
       </p:sp>
@@ -3576,13 +3922,13 @@
           <a:p>
             <a:r>
               <a:rPr lang="en-US" dirty="0"/>
-              <a:t>Mysterious Name: Naming of functions, modules, variables or classes that does not communicate their intent</a:t>
+              <a:t>Mysterious Name: Naming of functions, modules, variables or classes that does not communicate their intent.</a:t>
             </a:r>
           </a:p>
           <a:p>
             <a:r>
               <a:rPr lang="en-US" dirty="0"/>
-              <a:t>Duplicated code: identical or very similar code that exists in more than one location (</a:t>
+              <a:t>Duplicated code: Identical or very similar code that exists in more than one location (</a:t>
             </a:r>
             <a:r>
               <a:rPr lang="en-US" i="1" dirty="0"/>
@@ -3590,19 +3936,26 @@
             </a:r>
             <a:r>
               <a:rPr lang="en-US" dirty="0"/>
-              <a:t> copy pasta)</a:t>
+              <a:t> copy pasta).</a:t>
             </a:r>
           </a:p>
           <a:p>
             <a:r>
               <a:rPr lang="en-US" dirty="0"/>
-              <a:t>Contrived complexity: forced usage of overcomplicated design patterns where simpler design patterns would suffice</a:t>
+              <a:t>Contrived/accidental complexity: Forced usage of overcomplicated design patterns where simpler design patterns would suffice.</a:t>
             </a:r>
           </a:p>
           <a:p>
             <a:r>
               <a:rPr lang="en-US" dirty="0"/>
-              <a:t>Uncontrolled side effects: side effects of coding that commonly cause runtime exceptions, with unit tests unable to capture the exact cause of the problem</a:t>
+              <a:t>Uncontrolled side effects: Side effects of coding that commonly cause runtime exceptions. </a:t>
+            </a:r>
+          </a:p>
+          <a:p>
+            <a:pPr lvl="1"/>
+            <a:r>
+              <a:rPr lang="en-US" dirty="0"/>
+              <a:t>Unit tests are unable to capture the exact cause of the problem.</a:t>
             </a:r>
           </a:p>
           <a:p>
@@ -3620,6 +3973,278 @@
   <p:clrMapOvr>
     <a:masterClrMapping/>
   </p:clrMapOvr>
+  <mc:AlternateContent xmlns:mc="http://schemas.openxmlformats.org/markup-compatibility/2006">
+    <mc:Choice xmlns:p14="http://schemas.microsoft.com/office/powerpoint/2010/main" Requires="p14">
+      <p:transition spd="med" p14:dur="700">
+        <p:fade/>
+      </p:transition>
+    </mc:Choice>
+    <mc:Fallback>
+      <p:transition spd="med">
+        <p:fade/>
+      </p:transition>
+    </mc:Fallback>
+  </mc:AlternateContent>
+  <p:timing>
+    <p:tnLst>
+      <p:par>
+        <p:cTn id="1" dur="indefinite" restart="never" nodeType="tmRoot">
+          <p:childTnLst>
+            <p:seq concurrent="1" nextAc="seek">
+              <p:cTn id="2" dur="indefinite" nodeType="mainSeq">
+                <p:childTnLst>
+                  <p:par>
+                    <p:cTn id="3" fill="hold">
+                      <p:stCondLst>
+                        <p:cond delay="indefinite"/>
+                      </p:stCondLst>
+                      <p:childTnLst>
+                        <p:par>
+                          <p:cTn id="4" fill="hold">
+                            <p:stCondLst>
+                              <p:cond delay="0"/>
+                            </p:stCondLst>
+                            <p:childTnLst>
+                              <p:par>
+                                <p:cTn id="5" presetID="1" presetClass="entr" presetSubtype="0" fill="hold" grpId="0" nodeType="clickEffect">
+                                  <p:stCondLst>
+                                    <p:cond delay="0"/>
+                                  </p:stCondLst>
+                                  <p:childTnLst>
+                                    <p:set>
+                                      <p:cBhvr>
+                                        <p:cTn id="6" dur="1" fill="hold">
+                                          <p:stCondLst>
+                                            <p:cond delay="0"/>
+                                          </p:stCondLst>
+                                        </p:cTn>
+                                        <p:tgtEl>
+                                          <p:spTgt spid="3">
+                                            <p:txEl>
+                                              <p:pRg st="0" end="0"/>
+                                            </p:txEl>
+                                          </p:spTgt>
+                                        </p:tgtEl>
+                                        <p:attrNameLst>
+                                          <p:attrName>style.visibility</p:attrName>
+                                        </p:attrNameLst>
+                                      </p:cBhvr>
+                                      <p:to>
+                                        <p:strVal val="visible"/>
+                                      </p:to>
+                                    </p:set>
+                                  </p:childTnLst>
+                                </p:cTn>
+                              </p:par>
+                            </p:childTnLst>
+                          </p:cTn>
+                        </p:par>
+                      </p:childTnLst>
+                    </p:cTn>
+                  </p:par>
+                  <p:par>
+                    <p:cTn id="7" fill="hold">
+                      <p:stCondLst>
+                        <p:cond delay="indefinite"/>
+                      </p:stCondLst>
+                      <p:childTnLst>
+                        <p:par>
+                          <p:cTn id="8" fill="hold">
+                            <p:stCondLst>
+                              <p:cond delay="0"/>
+                            </p:stCondLst>
+                            <p:childTnLst>
+                              <p:par>
+                                <p:cTn id="9" presetID="1" presetClass="entr" presetSubtype="0" fill="hold" grpId="0" nodeType="clickEffect">
+                                  <p:stCondLst>
+                                    <p:cond delay="0"/>
+                                  </p:stCondLst>
+                                  <p:childTnLst>
+                                    <p:set>
+                                      <p:cBhvr>
+                                        <p:cTn id="10" dur="1" fill="hold">
+                                          <p:stCondLst>
+                                            <p:cond delay="0"/>
+                                          </p:stCondLst>
+                                        </p:cTn>
+                                        <p:tgtEl>
+                                          <p:spTgt spid="3">
+                                            <p:txEl>
+                                              <p:pRg st="1" end="1"/>
+                                            </p:txEl>
+                                          </p:spTgt>
+                                        </p:tgtEl>
+                                        <p:attrNameLst>
+                                          <p:attrName>style.visibility</p:attrName>
+                                        </p:attrNameLst>
+                                      </p:cBhvr>
+                                      <p:to>
+                                        <p:strVal val="visible"/>
+                                      </p:to>
+                                    </p:set>
+                                  </p:childTnLst>
+                                </p:cTn>
+                              </p:par>
+                            </p:childTnLst>
+                          </p:cTn>
+                        </p:par>
+                      </p:childTnLst>
+                    </p:cTn>
+                  </p:par>
+                  <p:par>
+                    <p:cTn id="11" fill="hold">
+                      <p:stCondLst>
+                        <p:cond delay="indefinite"/>
+                      </p:stCondLst>
+                      <p:childTnLst>
+                        <p:par>
+                          <p:cTn id="12" fill="hold">
+                            <p:stCondLst>
+                              <p:cond delay="0"/>
+                            </p:stCondLst>
+                            <p:childTnLst>
+                              <p:par>
+                                <p:cTn id="13" presetID="1" presetClass="entr" presetSubtype="0" fill="hold" grpId="0" nodeType="clickEffect">
+                                  <p:stCondLst>
+                                    <p:cond delay="0"/>
+                                  </p:stCondLst>
+                                  <p:childTnLst>
+                                    <p:set>
+                                      <p:cBhvr>
+                                        <p:cTn id="14" dur="1" fill="hold">
+                                          <p:stCondLst>
+                                            <p:cond delay="0"/>
+                                          </p:stCondLst>
+                                        </p:cTn>
+                                        <p:tgtEl>
+                                          <p:spTgt spid="3">
+                                            <p:txEl>
+                                              <p:pRg st="2" end="2"/>
+                                            </p:txEl>
+                                          </p:spTgt>
+                                        </p:tgtEl>
+                                        <p:attrNameLst>
+                                          <p:attrName>style.visibility</p:attrName>
+                                        </p:attrNameLst>
+                                      </p:cBhvr>
+                                      <p:to>
+                                        <p:strVal val="visible"/>
+                                      </p:to>
+                                    </p:set>
+                                  </p:childTnLst>
+                                </p:cTn>
+                              </p:par>
+                            </p:childTnLst>
+                          </p:cTn>
+                        </p:par>
+                      </p:childTnLst>
+                    </p:cTn>
+                  </p:par>
+                  <p:par>
+                    <p:cTn id="15" fill="hold">
+                      <p:stCondLst>
+                        <p:cond delay="indefinite"/>
+                      </p:stCondLst>
+                      <p:childTnLst>
+                        <p:par>
+                          <p:cTn id="16" fill="hold">
+                            <p:stCondLst>
+                              <p:cond delay="0"/>
+                            </p:stCondLst>
+                            <p:childTnLst>
+                              <p:par>
+                                <p:cTn id="17" presetID="1" presetClass="entr" presetSubtype="0" fill="hold" grpId="0" nodeType="clickEffect">
+                                  <p:stCondLst>
+                                    <p:cond delay="0"/>
+                                  </p:stCondLst>
+                                  <p:childTnLst>
+                                    <p:set>
+                                      <p:cBhvr>
+                                        <p:cTn id="18" dur="1" fill="hold">
+                                          <p:stCondLst>
+                                            <p:cond delay="0"/>
+                                          </p:stCondLst>
+                                        </p:cTn>
+                                        <p:tgtEl>
+                                          <p:spTgt spid="3">
+                                            <p:txEl>
+                                              <p:pRg st="3" end="3"/>
+                                            </p:txEl>
+                                          </p:spTgt>
+                                        </p:tgtEl>
+                                        <p:attrNameLst>
+                                          <p:attrName>style.visibility</p:attrName>
+                                        </p:attrNameLst>
+                                      </p:cBhvr>
+                                      <p:to>
+                                        <p:strVal val="visible"/>
+                                      </p:to>
+                                    </p:set>
+                                  </p:childTnLst>
+                                </p:cTn>
+                              </p:par>
+                              <p:par>
+                                <p:cTn id="19" presetID="1" presetClass="entr" presetSubtype="0" fill="hold" grpId="0" nodeType="withEffect">
+                                  <p:stCondLst>
+                                    <p:cond delay="0"/>
+                                  </p:stCondLst>
+                                  <p:childTnLst>
+                                    <p:set>
+                                      <p:cBhvr>
+                                        <p:cTn id="20" dur="1" fill="hold">
+                                          <p:stCondLst>
+                                            <p:cond delay="0"/>
+                                          </p:stCondLst>
+                                        </p:cTn>
+                                        <p:tgtEl>
+                                          <p:spTgt spid="3">
+                                            <p:txEl>
+                                              <p:pRg st="4" end="4"/>
+                                            </p:txEl>
+                                          </p:spTgt>
+                                        </p:tgtEl>
+                                        <p:attrNameLst>
+                                          <p:attrName>style.visibility</p:attrName>
+                                        </p:attrNameLst>
+                                      </p:cBhvr>
+                                      <p:to>
+                                        <p:strVal val="visible"/>
+                                      </p:to>
+                                    </p:set>
+                                  </p:childTnLst>
+                                </p:cTn>
+                              </p:par>
+                            </p:childTnLst>
+                          </p:cTn>
+                        </p:par>
+                      </p:childTnLst>
+                    </p:cTn>
+                  </p:par>
+                </p:childTnLst>
+              </p:cTn>
+              <p:prevCondLst>
+                <p:cond evt="onPrev" delay="0">
+                  <p:tgtEl>
+                    <p:sldTgt/>
+                  </p:tgtEl>
+                </p:cond>
+              </p:prevCondLst>
+              <p:nextCondLst>
+                <p:cond evt="onNext" delay="0">
+                  <p:tgtEl>
+                    <p:sldTgt/>
+                  </p:tgtEl>
+                </p:cond>
+              </p:nextCondLst>
+            </p:seq>
+          </p:childTnLst>
+        </p:cTn>
+      </p:par>
+    </p:tnLst>
+    <p:bldLst>
+      <p:bldP spid="3" grpId="0" build="p"/>
+    </p:bldLst>
+  </p:timing>
 </p:sld>
 </file>
 
@@ -3662,10 +4287,9 @@
           <a:lstStyle/>
           <a:p>
             <a:r>
-              <a:rPr lang="en-US" b="1" dirty="0"/>
+              <a:rPr lang="en-US" dirty="0"/>
               <a:t>Code smell examples: Class level</a:t>
             </a:r>
-            <a:endParaRPr lang="en-US" dirty="0"/>
           </a:p>
         </p:txBody>
       </p:sp>
@@ -3688,13 +4312,13 @@
         <p:spPr/>
         <p:txBody>
           <a:bodyPr>
-            <a:normAutofit fontScale="92500"/>
+            <a:normAutofit/>
           </a:bodyPr>
           <a:lstStyle/>
           <a:p>
             <a:r>
               <a:rPr lang="en-US" dirty="0"/>
-              <a:t>Large class: Class has grown too large and has too many responsibilities (</a:t>
+              <a:t>Large class: Class has grown too large, has too many responsibilities and has low cohesion (</a:t>
             </a:r>
             <a:r>
               <a:rPr lang="en-US" i="1" dirty="0"/>
@@ -3702,31 +4326,25 @@
             </a:r>
             <a:r>
               <a:rPr lang="en-US" dirty="0"/>
-              <a:t> God object)</a:t>
+              <a:t> God object).</a:t>
             </a:r>
           </a:p>
           <a:p>
             <a:r>
               <a:rPr lang="en-US" dirty="0"/>
-              <a:t>God objects: a class that has lots of responsibilities and is low cohesive.</a:t>
+              <a:t>Feature envy: Class that uses methods of another class excessively and has no responsibility of its own.</a:t>
             </a:r>
           </a:p>
           <a:p>
             <a:r>
               <a:rPr lang="en-US" dirty="0"/>
-              <a:t>Feature envy: a class that uses methods of another class excessively and has no responsibility of its own</a:t>
+              <a:t>Inappropriate intimacy: Class that has dependencies on implementation details of another class.</a:t>
             </a:r>
           </a:p>
           <a:p>
             <a:r>
               <a:rPr lang="en-US" dirty="0"/>
-              <a:t>Inappropriate intimacy: a class that has dependencies on implementation details of another class</a:t>
-            </a:r>
-          </a:p>
-          <a:p>
-            <a:r>
-              <a:rPr lang="en-US" dirty="0"/>
-              <a:t>Refused bequest: a class that overrides a method of a base class in such a way that the contract of the base class is not honored by the derived class </a:t>
+              <a:t>Refused bequest: Class that overrides a method of a base class in such a way that the contract of the base class is not honored by the derived class. </a:t>
             </a:r>
           </a:p>
         </p:txBody>
@@ -3741,6 +4359,247 @@
   <p:clrMapOvr>
     <a:masterClrMapping/>
   </p:clrMapOvr>
+  <mc:AlternateContent xmlns:mc="http://schemas.openxmlformats.org/markup-compatibility/2006">
+    <mc:Choice xmlns:p14="http://schemas.microsoft.com/office/powerpoint/2010/main" Requires="p14">
+      <p:transition spd="med" p14:dur="700">
+        <p:fade/>
+      </p:transition>
+    </mc:Choice>
+    <mc:Fallback>
+      <p:transition spd="med">
+        <p:fade/>
+      </p:transition>
+    </mc:Fallback>
+  </mc:AlternateContent>
+  <p:timing>
+    <p:tnLst>
+      <p:par>
+        <p:cTn id="1" dur="indefinite" restart="never" nodeType="tmRoot">
+          <p:childTnLst>
+            <p:seq concurrent="1" nextAc="seek">
+              <p:cTn id="2" dur="indefinite" nodeType="mainSeq">
+                <p:childTnLst>
+                  <p:par>
+                    <p:cTn id="3" fill="hold">
+                      <p:stCondLst>
+                        <p:cond delay="indefinite"/>
+                      </p:stCondLst>
+                      <p:childTnLst>
+                        <p:par>
+                          <p:cTn id="4" fill="hold">
+                            <p:stCondLst>
+                              <p:cond delay="0"/>
+                            </p:stCondLst>
+                            <p:childTnLst>
+                              <p:par>
+                                <p:cTn id="5" presetID="1" presetClass="entr" presetSubtype="0" fill="hold" grpId="0" nodeType="clickEffect">
+                                  <p:stCondLst>
+                                    <p:cond delay="0"/>
+                                  </p:stCondLst>
+                                  <p:childTnLst>
+                                    <p:set>
+                                      <p:cBhvr>
+                                        <p:cTn id="6" dur="1" fill="hold">
+                                          <p:stCondLst>
+                                            <p:cond delay="0"/>
+                                          </p:stCondLst>
+                                        </p:cTn>
+                                        <p:tgtEl>
+                                          <p:spTgt spid="3">
+                                            <p:txEl>
+                                              <p:pRg st="0" end="0"/>
+                                            </p:txEl>
+                                          </p:spTgt>
+                                        </p:tgtEl>
+                                        <p:attrNameLst>
+                                          <p:attrName>style.visibility</p:attrName>
+                                        </p:attrNameLst>
+                                      </p:cBhvr>
+                                      <p:to>
+                                        <p:strVal val="visible"/>
+                                      </p:to>
+                                    </p:set>
+                                  </p:childTnLst>
+                                </p:cTn>
+                              </p:par>
+                            </p:childTnLst>
+                          </p:cTn>
+                        </p:par>
+                      </p:childTnLst>
+                    </p:cTn>
+                  </p:par>
+                  <p:par>
+                    <p:cTn id="7" fill="hold">
+                      <p:stCondLst>
+                        <p:cond delay="indefinite"/>
+                      </p:stCondLst>
+                      <p:childTnLst>
+                        <p:par>
+                          <p:cTn id="8" fill="hold">
+                            <p:stCondLst>
+                              <p:cond delay="0"/>
+                            </p:stCondLst>
+                            <p:childTnLst>
+                              <p:par>
+                                <p:cTn id="9" presetID="1" presetClass="entr" presetSubtype="0" fill="hold" grpId="0" nodeType="clickEffect">
+                                  <p:stCondLst>
+                                    <p:cond delay="0"/>
+                                  </p:stCondLst>
+                                  <p:childTnLst>
+                                    <p:set>
+                                      <p:cBhvr>
+                                        <p:cTn id="10" dur="1" fill="hold">
+                                          <p:stCondLst>
+                                            <p:cond delay="0"/>
+                                          </p:stCondLst>
+                                        </p:cTn>
+                                        <p:tgtEl>
+                                          <p:spTgt spid="3">
+                                            <p:txEl>
+                                              <p:pRg st="1" end="1"/>
+                                            </p:txEl>
+                                          </p:spTgt>
+                                        </p:tgtEl>
+                                        <p:attrNameLst>
+                                          <p:attrName>style.visibility</p:attrName>
+                                        </p:attrNameLst>
+                                      </p:cBhvr>
+                                      <p:to>
+                                        <p:strVal val="visible"/>
+                                      </p:to>
+                                    </p:set>
+                                  </p:childTnLst>
+                                </p:cTn>
+                              </p:par>
+                            </p:childTnLst>
+                          </p:cTn>
+                        </p:par>
+                      </p:childTnLst>
+                    </p:cTn>
+                  </p:par>
+                  <p:par>
+                    <p:cTn id="11" fill="hold">
+                      <p:stCondLst>
+                        <p:cond delay="indefinite"/>
+                      </p:stCondLst>
+                      <p:childTnLst>
+                        <p:par>
+                          <p:cTn id="12" fill="hold">
+                            <p:stCondLst>
+                              <p:cond delay="0"/>
+                            </p:stCondLst>
+                            <p:childTnLst>
+                              <p:par>
+                                <p:cTn id="13" presetID="1" presetClass="entr" presetSubtype="0" fill="hold" grpId="0" nodeType="clickEffect">
+                                  <p:stCondLst>
+                                    <p:cond delay="0"/>
+                                  </p:stCondLst>
+                                  <p:childTnLst>
+                                    <p:set>
+                                      <p:cBhvr>
+                                        <p:cTn id="14" dur="1" fill="hold">
+                                          <p:stCondLst>
+                                            <p:cond delay="0"/>
+                                          </p:stCondLst>
+                                        </p:cTn>
+                                        <p:tgtEl>
+                                          <p:spTgt spid="3">
+                                            <p:txEl>
+                                              <p:pRg st="2" end="2"/>
+                                            </p:txEl>
+                                          </p:spTgt>
+                                        </p:tgtEl>
+                                        <p:attrNameLst>
+                                          <p:attrName>style.visibility</p:attrName>
+                                        </p:attrNameLst>
+                                      </p:cBhvr>
+                                      <p:to>
+                                        <p:strVal val="visible"/>
+                                      </p:to>
+                                    </p:set>
+                                  </p:childTnLst>
+                                </p:cTn>
+                              </p:par>
+                            </p:childTnLst>
+                          </p:cTn>
+                        </p:par>
+                      </p:childTnLst>
+                    </p:cTn>
+                  </p:par>
+                  <p:par>
+                    <p:cTn id="15" fill="hold">
+                      <p:stCondLst>
+                        <p:cond delay="indefinite"/>
+                      </p:stCondLst>
+                      <p:childTnLst>
+                        <p:par>
+                          <p:cTn id="16" fill="hold">
+                            <p:stCondLst>
+                              <p:cond delay="0"/>
+                            </p:stCondLst>
+                            <p:childTnLst>
+                              <p:par>
+                                <p:cTn id="17" presetID="1" presetClass="entr" presetSubtype="0" fill="hold" grpId="0" nodeType="clickEffect">
+                                  <p:stCondLst>
+                                    <p:cond delay="0"/>
+                                  </p:stCondLst>
+                                  <p:childTnLst>
+                                    <p:set>
+                                      <p:cBhvr>
+                                        <p:cTn id="18" dur="1" fill="hold">
+                                          <p:stCondLst>
+                                            <p:cond delay="0"/>
+                                          </p:stCondLst>
+                                        </p:cTn>
+                                        <p:tgtEl>
+                                          <p:spTgt spid="3">
+                                            <p:txEl>
+                                              <p:pRg st="3" end="3"/>
+                                            </p:txEl>
+                                          </p:spTgt>
+                                        </p:tgtEl>
+                                        <p:attrNameLst>
+                                          <p:attrName>style.visibility</p:attrName>
+                                        </p:attrNameLst>
+                                      </p:cBhvr>
+                                      <p:to>
+                                        <p:strVal val="visible"/>
+                                      </p:to>
+                                    </p:set>
+                                  </p:childTnLst>
+                                </p:cTn>
+                              </p:par>
+                            </p:childTnLst>
+                          </p:cTn>
+                        </p:par>
+                      </p:childTnLst>
+                    </p:cTn>
+                  </p:par>
+                </p:childTnLst>
+              </p:cTn>
+              <p:prevCondLst>
+                <p:cond evt="onPrev" delay="0">
+                  <p:tgtEl>
+                    <p:sldTgt/>
+                  </p:tgtEl>
+                </p:cond>
+              </p:prevCondLst>
+              <p:nextCondLst>
+                <p:cond evt="onNext" delay="0">
+                  <p:tgtEl>
+                    <p:sldTgt/>
+                  </p:tgtEl>
+                </p:cond>
+              </p:nextCondLst>
+            </p:seq>
+          </p:childTnLst>
+        </p:cTn>
+      </p:par>
+    </p:tnLst>
+    <p:bldLst>
+      <p:bldP spid="3" grpId="0" build="p"/>
+    </p:bldLst>
+  </p:timing>
 </p:sld>
 </file>
 
@@ -3783,10 +4642,9 @@
           <a:lstStyle/>
           <a:p>
             <a:r>
-              <a:rPr lang="en-US" b="1" dirty="0"/>
+              <a:rPr lang="en-US" dirty="0"/>
               <a:t>Code smell examples: Class level</a:t>
             </a:r>
-            <a:endParaRPr lang="en-US" dirty="0"/>
           </a:p>
         </p:txBody>
       </p:sp>
@@ -3813,13 +4671,13 @@
           <a:p>
             <a:r>
               <a:rPr lang="en-US" dirty="0"/>
-              <a:t>Excessive use of literals: Literals should be coded as named constants, to improve readability and to avoid programming errors </a:t>
+              <a:t>Excessive use of literals: Literals should be coded as named constants, to improve readability and to avoid programming errors. </a:t>
             </a:r>
           </a:p>
           <a:p>
             <a:r>
               <a:rPr lang="en-US" dirty="0"/>
-              <a:t>Cyclomatic complexity: Too many branches or loops, indicating that a function needs to be broken up into smaller functions, or that it has potential for simplification/refactoring</a:t>
+              <a:t>Cyclomatic complexity: Too many branches or loops, indicating that a function needs to be broken up into smaller functions, or that it has potential for simplification/refactoring.</a:t>
             </a:r>
           </a:p>
           <a:p>
@@ -3829,7 +4687,14 @@
             </a:r>
             <a:r>
               <a:rPr lang="en-US" dirty="0"/>
-              <a:t>: Typecasting to a specific derived type which breaks the abstraction model; the abstraction may have to be refactored or eliminated</a:t>
+              <a:t>: Typecasting to a specific derived type which breaks the abstraction model. </a:t>
+            </a:r>
+          </a:p>
+          <a:p>
+            <a:pPr lvl="1"/>
+            <a:r>
+              <a:rPr lang="en-US" dirty="0"/>
+              <a:t>The abstraction may have to be refactored or eliminated.</a:t>
             </a:r>
           </a:p>
           <a:p>
@@ -3850,6 +4715,229 @@
   <p:clrMapOvr>
     <a:masterClrMapping/>
   </p:clrMapOvr>
+  <mc:AlternateContent xmlns:mc="http://schemas.openxmlformats.org/markup-compatibility/2006">
+    <mc:Choice xmlns:p14="http://schemas.microsoft.com/office/powerpoint/2010/main" Requires="p14">
+      <p:transition spd="med" p14:dur="700">
+        <p:fade/>
+      </p:transition>
+    </mc:Choice>
+    <mc:Fallback>
+      <p:transition spd="med">
+        <p:fade/>
+      </p:transition>
+    </mc:Fallback>
+  </mc:AlternateContent>
+  <p:timing>
+    <p:tnLst>
+      <p:par>
+        <p:cTn id="1" dur="indefinite" restart="never" nodeType="tmRoot">
+          <p:childTnLst>
+            <p:seq concurrent="1" nextAc="seek">
+              <p:cTn id="2" dur="indefinite" nodeType="mainSeq">
+                <p:childTnLst>
+                  <p:par>
+                    <p:cTn id="3" fill="hold">
+                      <p:stCondLst>
+                        <p:cond delay="indefinite"/>
+                      </p:stCondLst>
+                      <p:childTnLst>
+                        <p:par>
+                          <p:cTn id="4" fill="hold">
+                            <p:stCondLst>
+                              <p:cond delay="0"/>
+                            </p:stCondLst>
+                            <p:childTnLst>
+                              <p:par>
+                                <p:cTn id="5" presetID="1" presetClass="entr" presetSubtype="0" fill="hold" grpId="0" nodeType="clickEffect">
+                                  <p:stCondLst>
+                                    <p:cond delay="0"/>
+                                  </p:stCondLst>
+                                  <p:childTnLst>
+                                    <p:set>
+                                      <p:cBhvr>
+                                        <p:cTn id="6" dur="1" fill="hold">
+                                          <p:stCondLst>
+                                            <p:cond delay="0"/>
+                                          </p:stCondLst>
+                                        </p:cTn>
+                                        <p:tgtEl>
+                                          <p:spTgt spid="3">
+                                            <p:txEl>
+                                              <p:pRg st="0" end="0"/>
+                                            </p:txEl>
+                                          </p:spTgt>
+                                        </p:tgtEl>
+                                        <p:attrNameLst>
+                                          <p:attrName>style.visibility</p:attrName>
+                                        </p:attrNameLst>
+                                      </p:cBhvr>
+                                      <p:to>
+                                        <p:strVal val="visible"/>
+                                      </p:to>
+                                    </p:set>
+                                  </p:childTnLst>
+                                </p:cTn>
+                              </p:par>
+                            </p:childTnLst>
+                          </p:cTn>
+                        </p:par>
+                      </p:childTnLst>
+                    </p:cTn>
+                  </p:par>
+                  <p:par>
+                    <p:cTn id="7" fill="hold">
+                      <p:stCondLst>
+                        <p:cond delay="indefinite"/>
+                      </p:stCondLst>
+                      <p:childTnLst>
+                        <p:par>
+                          <p:cTn id="8" fill="hold">
+                            <p:stCondLst>
+                              <p:cond delay="0"/>
+                            </p:stCondLst>
+                            <p:childTnLst>
+                              <p:par>
+                                <p:cTn id="9" presetID="1" presetClass="entr" presetSubtype="0" fill="hold" grpId="0" nodeType="clickEffect">
+                                  <p:stCondLst>
+                                    <p:cond delay="0"/>
+                                  </p:stCondLst>
+                                  <p:childTnLst>
+                                    <p:set>
+                                      <p:cBhvr>
+                                        <p:cTn id="10" dur="1" fill="hold">
+                                          <p:stCondLst>
+                                            <p:cond delay="0"/>
+                                          </p:stCondLst>
+                                        </p:cTn>
+                                        <p:tgtEl>
+                                          <p:spTgt spid="3">
+                                            <p:txEl>
+                                              <p:pRg st="1" end="1"/>
+                                            </p:txEl>
+                                          </p:spTgt>
+                                        </p:tgtEl>
+                                        <p:attrNameLst>
+                                          <p:attrName>style.visibility</p:attrName>
+                                        </p:attrNameLst>
+                                      </p:cBhvr>
+                                      <p:to>
+                                        <p:strVal val="visible"/>
+                                      </p:to>
+                                    </p:set>
+                                  </p:childTnLst>
+                                </p:cTn>
+                              </p:par>
+                            </p:childTnLst>
+                          </p:cTn>
+                        </p:par>
+                      </p:childTnLst>
+                    </p:cTn>
+                  </p:par>
+                  <p:par>
+                    <p:cTn id="11" fill="hold">
+                      <p:stCondLst>
+                        <p:cond delay="indefinite"/>
+                      </p:stCondLst>
+                      <p:childTnLst>
+                        <p:par>
+                          <p:cTn id="12" fill="hold">
+                            <p:stCondLst>
+                              <p:cond delay="0"/>
+                            </p:stCondLst>
+                            <p:childTnLst>
+                              <p:par>
+                                <p:cTn id="13" presetID="1" presetClass="entr" presetSubtype="0" fill="hold" grpId="0" nodeType="clickEffect">
+                                  <p:stCondLst>
+                                    <p:cond delay="0"/>
+                                  </p:stCondLst>
+                                  <p:childTnLst>
+                                    <p:set>
+                                      <p:cBhvr>
+                                        <p:cTn id="14" dur="1" fill="hold">
+                                          <p:stCondLst>
+                                            <p:cond delay="0"/>
+                                          </p:stCondLst>
+                                        </p:cTn>
+                                        <p:tgtEl>
+                                          <p:spTgt spid="3">
+                                            <p:txEl>
+                                              <p:pRg st="2" end="2"/>
+                                            </p:txEl>
+                                          </p:spTgt>
+                                        </p:tgtEl>
+                                        <p:attrNameLst>
+                                          <p:attrName>style.visibility</p:attrName>
+                                        </p:attrNameLst>
+                                      </p:cBhvr>
+                                      <p:to>
+                                        <p:strVal val="visible"/>
+                                      </p:to>
+                                    </p:set>
+                                  </p:childTnLst>
+                                </p:cTn>
+                              </p:par>
+                              <p:par>
+                                <p:cTn id="15" presetID="1" presetClass="entr" presetSubtype="0" fill="hold" grpId="0" nodeType="withEffect">
+                                  <p:stCondLst>
+                                    <p:cond delay="0"/>
+                                  </p:stCondLst>
+                                  <p:childTnLst>
+                                    <p:set>
+                                      <p:cBhvr>
+                                        <p:cTn id="16" dur="1" fill="hold">
+                                          <p:stCondLst>
+                                            <p:cond delay="0"/>
+                                          </p:stCondLst>
+                                        </p:cTn>
+                                        <p:tgtEl>
+                                          <p:spTgt spid="3">
+                                            <p:txEl>
+                                              <p:pRg st="3" end="3"/>
+                                            </p:txEl>
+                                          </p:spTgt>
+                                        </p:tgtEl>
+                                        <p:attrNameLst>
+                                          <p:attrName>style.visibility</p:attrName>
+                                        </p:attrNameLst>
+                                      </p:cBhvr>
+                                      <p:to>
+                                        <p:strVal val="visible"/>
+                                      </p:to>
+                                    </p:set>
+                                  </p:childTnLst>
+                                </p:cTn>
+                              </p:par>
+                            </p:childTnLst>
+                          </p:cTn>
+                        </p:par>
+                      </p:childTnLst>
+                    </p:cTn>
+                  </p:par>
+                </p:childTnLst>
+              </p:cTn>
+              <p:prevCondLst>
+                <p:cond evt="onPrev" delay="0">
+                  <p:tgtEl>
+                    <p:sldTgt/>
+                  </p:tgtEl>
+                </p:cond>
+              </p:prevCondLst>
+              <p:nextCondLst>
+                <p:cond evt="onNext" delay="0">
+                  <p:tgtEl>
+                    <p:sldTgt/>
+                  </p:tgtEl>
+                </p:cond>
+              </p:nextCondLst>
+            </p:seq>
+          </p:childTnLst>
+        </p:cTn>
+      </p:par>
+    </p:tnLst>
+    <p:bldLst>
+      <p:bldP spid="3" grpId="0" build="p"/>
+    </p:bldLst>
+  </p:timing>
 </p:sld>
 </file>
 
@@ -3892,10 +4980,9 @@
           <a:lstStyle/>
           <a:p>
             <a:r>
-              <a:rPr lang="en-US" b="1" dirty="0"/>
+              <a:rPr lang="en-US" dirty="0"/>
               <a:t>Code smell examples: Class level</a:t>
             </a:r>
-            <a:endParaRPr lang="en-US" dirty="0"/>
           </a:p>
         </p:txBody>
       </p:sp>
@@ -3922,13 +5009,20 @@
           <a:p>
             <a:r>
               <a:rPr lang="en-US" dirty="0"/>
-              <a:t>Orphan variable or constant class: a class that typically has a collection of constants which belong elsewhere where those constants should be owned by one of the other member classes</a:t>
+              <a:t>Orphan variable or constant class: Class that typically has a collection of constants which belong elsewhere where those constants should be owned by one of the other member classes.</a:t>
             </a:r>
           </a:p>
           <a:p>
             <a:r>
               <a:rPr lang="en-US" dirty="0"/>
-              <a:t>Data clump: Occurs when a group of variables are passed around together in various parts of the program. In general, this suggests that it would be more appropriate to formally group the different variables together into a single object, and pass around only the new object instead</a:t>
+              <a:t>Data clump: Occurs when a group of variables are passed around together in various parts of the program. </a:t>
+            </a:r>
+          </a:p>
+          <a:p>
+            <a:pPr lvl="1"/>
+            <a:r>
+              <a:rPr lang="en-US" dirty="0"/>
+              <a:t>More appropriate to formally group the different variables together into a single object and pass that object around instead.</a:t>
             </a:r>
           </a:p>
           <a:p>
@@ -3949,6 +5043,180 @@
   <p:clrMapOvr>
     <a:masterClrMapping/>
   </p:clrMapOvr>
+  <mc:AlternateContent xmlns:mc="http://schemas.openxmlformats.org/markup-compatibility/2006">
+    <mc:Choice xmlns:p14="http://schemas.microsoft.com/office/powerpoint/2010/main" Requires="p14">
+      <p:transition spd="med" p14:dur="700">
+        <p:fade/>
+      </p:transition>
+    </mc:Choice>
+    <mc:Fallback>
+      <p:transition spd="med">
+        <p:fade/>
+      </p:transition>
+    </mc:Fallback>
+  </mc:AlternateContent>
+  <p:timing>
+    <p:tnLst>
+      <p:par>
+        <p:cTn id="1" dur="indefinite" restart="never" nodeType="tmRoot">
+          <p:childTnLst>
+            <p:seq concurrent="1" nextAc="seek">
+              <p:cTn id="2" dur="indefinite" nodeType="mainSeq">
+                <p:childTnLst>
+                  <p:par>
+                    <p:cTn id="3" fill="hold">
+                      <p:stCondLst>
+                        <p:cond delay="indefinite"/>
+                      </p:stCondLst>
+                      <p:childTnLst>
+                        <p:par>
+                          <p:cTn id="4" fill="hold">
+                            <p:stCondLst>
+                              <p:cond delay="0"/>
+                            </p:stCondLst>
+                            <p:childTnLst>
+                              <p:par>
+                                <p:cTn id="5" presetID="1" presetClass="entr" presetSubtype="0" fill="hold" grpId="0" nodeType="clickEffect">
+                                  <p:stCondLst>
+                                    <p:cond delay="0"/>
+                                  </p:stCondLst>
+                                  <p:childTnLst>
+                                    <p:set>
+                                      <p:cBhvr>
+                                        <p:cTn id="6" dur="1" fill="hold">
+                                          <p:stCondLst>
+                                            <p:cond delay="0"/>
+                                          </p:stCondLst>
+                                        </p:cTn>
+                                        <p:tgtEl>
+                                          <p:spTgt spid="3">
+                                            <p:txEl>
+                                              <p:pRg st="0" end="0"/>
+                                            </p:txEl>
+                                          </p:spTgt>
+                                        </p:tgtEl>
+                                        <p:attrNameLst>
+                                          <p:attrName>style.visibility</p:attrName>
+                                        </p:attrNameLst>
+                                      </p:cBhvr>
+                                      <p:to>
+                                        <p:strVal val="visible"/>
+                                      </p:to>
+                                    </p:set>
+                                  </p:childTnLst>
+                                </p:cTn>
+                              </p:par>
+                            </p:childTnLst>
+                          </p:cTn>
+                        </p:par>
+                      </p:childTnLst>
+                    </p:cTn>
+                  </p:par>
+                  <p:par>
+                    <p:cTn id="7" fill="hold">
+                      <p:stCondLst>
+                        <p:cond delay="indefinite"/>
+                      </p:stCondLst>
+                      <p:childTnLst>
+                        <p:par>
+                          <p:cTn id="8" fill="hold">
+                            <p:stCondLst>
+                              <p:cond delay="0"/>
+                            </p:stCondLst>
+                            <p:childTnLst>
+                              <p:par>
+                                <p:cTn id="9" presetID="1" presetClass="entr" presetSubtype="0" fill="hold" grpId="0" nodeType="clickEffect">
+                                  <p:stCondLst>
+                                    <p:cond delay="0"/>
+                                  </p:stCondLst>
+                                  <p:childTnLst>
+                                    <p:set>
+                                      <p:cBhvr>
+                                        <p:cTn id="10" dur="1" fill="hold">
+                                          <p:stCondLst>
+                                            <p:cond delay="0"/>
+                                          </p:stCondLst>
+                                        </p:cTn>
+                                        <p:tgtEl>
+                                          <p:spTgt spid="3">
+                                            <p:txEl>
+                                              <p:pRg st="1" end="1"/>
+                                            </p:txEl>
+                                          </p:spTgt>
+                                        </p:tgtEl>
+                                        <p:attrNameLst>
+                                          <p:attrName>style.visibility</p:attrName>
+                                        </p:attrNameLst>
+                                      </p:cBhvr>
+                                      <p:to>
+                                        <p:strVal val="visible"/>
+                                      </p:to>
+                                    </p:set>
+                                  </p:childTnLst>
+                                </p:cTn>
+                              </p:par>
+                              <p:par>
+                                <p:cTn id="11" presetID="1" presetClass="entr" presetSubtype="0" fill="hold" grpId="0" nodeType="withEffect">
+                                  <p:stCondLst>
+                                    <p:cond delay="0"/>
+                                  </p:stCondLst>
+                                  <p:childTnLst>
+                                    <p:set>
+                                      <p:cBhvr>
+                                        <p:cTn id="12" dur="1" fill="hold">
+                                          <p:stCondLst>
+                                            <p:cond delay="0"/>
+                                          </p:stCondLst>
+                                        </p:cTn>
+                                        <p:tgtEl>
+                                          <p:spTgt spid="3">
+                                            <p:txEl>
+                                              <p:pRg st="2" end="2"/>
+                                            </p:txEl>
+                                          </p:spTgt>
+                                        </p:tgtEl>
+                                        <p:attrNameLst>
+                                          <p:attrName>style.visibility</p:attrName>
+                                        </p:attrNameLst>
+                                      </p:cBhvr>
+                                      <p:to>
+                                        <p:strVal val="visible"/>
+                                      </p:to>
+                                    </p:set>
+                                  </p:childTnLst>
+                                </p:cTn>
+                              </p:par>
+                            </p:childTnLst>
+                          </p:cTn>
+                        </p:par>
+                      </p:childTnLst>
+                    </p:cTn>
+                  </p:par>
+                </p:childTnLst>
+              </p:cTn>
+              <p:prevCondLst>
+                <p:cond evt="onPrev" delay="0">
+                  <p:tgtEl>
+                    <p:sldTgt/>
+                  </p:tgtEl>
+                </p:cond>
+              </p:prevCondLst>
+              <p:nextCondLst>
+                <p:cond evt="onNext" delay="0">
+                  <p:tgtEl>
+                    <p:sldTgt/>
+                  </p:tgtEl>
+                </p:cond>
+              </p:nextCondLst>
+            </p:seq>
+          </p:childTnLst>
+        </p:cTn>
+      </p:par>
+    </p:tnLst>
+    <p:bldLst>
+      <p:bldP spid="3" grpId="0" build="p"/>
+    </p:bldLst>
+  </p:timing>
 </p:sld>
 </file>
 
@@ -3991,10 +5259,9 @@
           <a:lstStyle/>
           <a:p>
             <a:r>
-              <a:rPr lang="en-US" b="1" dirty="0"/>
+              <a:rPr lang="en-US" dirty="0"/>
               <a:t>Code smell examples: Method level</a:t>
             </a:r>
-            <a:endParaRPr lang="en-US" dirty="0"/>
           </a:p>
         </p:txBody>
       </p:sp>
@@ -4021,19 +5288,26 @@
           <a:p>
             <a:r>
               <a:rPr lang="en-US" dirty="0"/>
-              <a:t>Too many parameters: a long list of parameters is hard to read, and makes calling and testing the function complicated. It may indicate that the purpose of the function is ill-conceived and that the code should be refactored so responsibility is assigned in a more clean-cut way</a:t>
-            </a:r>
-          </a:p>
-          <a:p>
+              <a:t>Too many parameters: Long list of parameters is hard to read, and makes calling and testing the function complicated. </a:t>
+            </a:r>
+          </a:p>
+          <a:p>
+            <a:pPr lvl="1"/>
             <a:r>
               <a:rPr lang="en-US" dirty="0"/>
-              <a:t>Long method: a method, function, or procedure that has grown too large</a:t>
+              <a:t>It may indicate that the purpose of the function is ill-conceived and that the code should be refactored so responsibility is assigned in a more clean-cut way.</a:t>
             </a:r>
           </a:p>
           <a:p>
             <a:r>
               <a:rPr lang="en-US" dirty="0"/>
-              <a:t>Excessively long identifiers: in particular, the use of naming conventions to provide disambiguation that should be implicit in the software architecture</a:t>
+              <a:t>Long method: A method, function, or procedure that has grown too large.</a:t>
+            </a:r>
+          </a:p>
+          <a:p>
+            <a:r>
+              <a:rPr lang="en-US" dirty="0"/>
+              <a:t>Excessively long identifiers: The use of naming conventions to provide disambiguation that should be implicit in the software architecture.</a:t>
             </a:r>
           </a:p>
           <a:p>
@@ -4051,6 +5325,229 @@
   <p:clrMapOvr>
     <a:masterClrMapping/>
   </p:clrMapOvr>
+  <mc:AlternateContent xmlns:mc="http://schemas.openxmlformats.org/markup-compatibility/2006">
+    <mc:Choice xmlns:p14="http://schemas.microsoft.com/office/powerpoint/2010/main" Requires="p14">
+      <p:transition spd="med" p14:dur="700">
+        <p:fade/>
+      </p:transition>
+    </mc:Choice>
+    <mc:Fallback>
+      <p:transition spd="med">
+        <p:fade/>
+      </p:transition>
+    </mc:Fallback>
+  </mc:AlternateContent>
+  <p:timing>
+    <p:tnLst>
+      <p:par>
+        <p:cTn id="1" dur="indefinite" restart="never" nodeType="tmRoot">
+          <p:childTnLst>
+            <p:seq concurrent="1" nextAc="seek">
+              <p:cTn id="2" dur="indefinite" nodeType="mainSeq">
+                <p:childTnLst>
+                  <p:par>
+                    <p:cTn id="3" fill="hold">
+                      <p:stCondLst>
+                        <p:cond delay="indefinite"/>
+                      </p:stCondLst>
+                      <p:childTnLst>
+                        <p:par>
+                          <p:cTn id="4" fill="hold">
+                            <p:stCondLst>
+                              <p:cond delay="0"/>
+                            </p:stCondLst>
+                            <p:childTnLst>
+                              <p:par>
+                                <p:cTn id="5" presetID="1" presetClass="entr" presetSubtype="0" fill="hold" grpId="0" nodeType="clickEffect">
+                                  <p:stCondLst>
+                                    <p:cond delay="0"/>
+                                  </p:stCondLst>
+                                  <p:childTnLst>
+                                    <p:set>
+                                      <p:cBhvr>
+                                        <p:cTn id="6" dur="1" fill="hold">
+                                          <p:stCondLst>
+                                            <p:cond delay="0"/>
+                                          </p:stCondLst>
+                                        </p:cTn>
+                                        <p:tgtEl>
+                                          <p:spTgt spid="3">
+                                            <p:txEl>
+                                              <p:pRg st="0" end="0"/>
+                                            </p:txEl>
+                                          </p:spTgt>
+                                        </p:tgtEl>
+                                        <p:attrNameLst>
+                                          <p:attrName>style.visibility</p:attrName>
+                                        </p:attrNameLst>
+                                      </p:cBhvr>
+                                      <p:to>
+                                        <p:strVal val="visible"/>
+                                      </p:to>
+                                    </p:set>
+                                  </p:childTnLst>
+                                </p:cTn>
+                              </p:par>
+                              <p:par>
+                                <p:cTn id="7" presetID="1" presetClass="entr" presetSubtype="0" fill="hold" grpId="0" nodeType="withEffect">
+                                  <p:stCondLst>
+                                    <p:cond delay="0"/>
+                                  </p:stCondLst>
+                                  <p:childTnLst>
+                                    <p:set>
+                                      <p:cBhvr>
+                                        <p:cTn id="8" dur="1" fill="hold">
+                                          <p:stCondLst>
+                                            <p:cond delay="0"/>
+                                          </p:stCondLst>
+                                        </p:cTn>
+                                        <p:tgtEl>
+                                          <p:spTgt spid="3">
+                                            <p:txEl>
+                                              <p:pRg st="1" end="1"/>
+                                            </p:txEl>
+                                          </p:spTgt>
+                                        </p:tgtEl>
+                                        <p:attrNameLst>
+                                          <p:attrName>style.visibility</p:attrName>
+                                        </p:attrNameLst>
+                                      </p:cBhvr>
+                                      <p:to>
+                                        <p:strVal val="visible"/>
+                                      </p:to>
+                                    </p:set>
+                                  </p:childTnLst>
+                                </p:cTn>
+                              </p:par>
+                            </p:childTnLst>
+                          </p:cTn>
+                        </p:par>
+                      </p:childTnLst>
+                    </p:cTn>
+                  </p:par>
+                  <p:par>
+                    <p:cTn id="9" fill="hold">
+                      <p:stCondLst>
+                        <p:cond delay="indefinite"/>
+                      </p:stCondLst>
+                      <p:childTnLst>
+                        <p:par>
+                          <p:cTn id="10" fill="hold">
+                            <p:stCondLst>
+                              <p:cond delay="0"/>
+                            </p:stCondLst>
+                            <p:childTnLst>
+                              <p:par>
+                                <p:cTn id="11" presetID="1" presetClass="entr" presetSubtype="0" fill="hold" grpId="0" nodeType="clickEffect">
+                                  <p:stCondLst>
+                                    <p:cond delay="0"/>
+                                  </p:stCondLst>
+                                  <p:childTnLst>
+                                    <p:set>
+                                      <p:cBhvr>
+                                        <p:cTn id="12" dur="1" fill="hold">
+                                          <p:stCondLst>
+                                            <p:cond delay="0"/>
+                                          </p:stCondLst>
+                                        </p:cTn>
+                                        <p:tgtEl>
+                                          <p:spTgt spid="3">
+                                            <p:txEl>
+                                              <p:pRg st="2" end="2"/>
+                                            </p:txEl>
+                                          </p:spTgt>
+                                        </p:tgtEl>
+                                        <p:attrNameLst>
+                                          <p:attrName>style.visibility</p:attrName>
+                                        </p:attrNameLst>
+                                      </p:cBhvr>
+                                      <p:to>
+                                        <p:strVal val="visible"/>
+                                      </p:to>
+                                    </p:set>
+                                  </p:childTnLst>
+                                </p:cTn>
+                              </p:par>
+                            </p:childTnLst>
+                          </p:cTn>
+                        </p:par>
+                      </p:childTnLst>
+                    </p:cTn>
+                  </p:par>
+                  <p:par>
+                    <p:cTn id="13" fill="hold">
+                      <p:stCondLst>
+                        <p:cond delay="indefinite"/>
+                      </p:stCondLst>
+                      <p:childTnLst>
+                        <p:par>
+                          <p:cTn id="14" fill="hold">
+                            <p:stCondLst>
+                              <p:cond delay="0"/>
+                            </p:stCondLst>
+                            <p:childTnLst>
+                              <p:par>
+                                <p:cTn id="15" presetID="1" presetClass="entr" presetSubtype="0" fill="hold" grpId="0" nodeType="clickEffect">
+                                  <p:stCondLst>
+                                    <p:cond delay="0"/>
+                                  </p:stCondLst>
+                                  <p:childTnLst>
+                                    <p:set>
+                                      <p:cBhvr>
+                                        <p:cTn id="16" dur="1" fill="hold">
+                                          <p:stCondLst>
+                                            <p:cond delay="0"/>
+                                          </p:stCondLst>
+                                        </p:cTn>
+                                        <p:tgtEl>
+                                          <p:spTgt spid="3">
+                                            <p:txEl>
+                                              <p:pRg st="3" end="3"/>
+                                            </p:txEl>
+                                          </p:spTgt>
+                                        </p:tgtEl>
+                                        <p:attrNameLst>
+                                          <p:attrName>style.visibility</p:attrName>
+                                        </p:attrNameLst>
+                                      </p:cBhvr>
+                                      <p:to>
+                                        <p:strVal val="visible"/>
+                                      </p:to>
+                                    </p:set>
+                                  </p:childTnLst>
+                                </p:cTn>
+                              </p:par>
+                            </p:childTnLst>
+                          </p:cTn>
+                        </p:par>
+                      </p:childTnLst>
+                    </p:cTn>
+                  </p:par>
+                </p:childTnLst>
+              </p:cTn>
+              <p:prevCondLst>
+                <p:cond evt="onPrev" delay="0">
+                  <p:tgtEl>
+                    <p:sldTgt/>
+                  </p:tgtEl>
+                </p:cond>
+              </p:prevCondLst>
+              <p:nextCondLst>
+                <p:cond evt="onNext" delay="0">
+                  <p:tgtEl>
+                    <p:sldTgt/>
+                  </p:tgtEl>
+                </p:cond>
+              </p:nextCondLst>
+            </p:seq>
+          </p:childTnLst>
+        </p:cTn>
+      </p:par>
+    </p:tnLst>
+    <p:bldLst>
+      <p:bldP spid="3" grpId="0" build="p"/>
+    </p:bldLst>
+  </p:timing>
 </p:sld>
 </file>
 
@@ -4093,10 +5590,9 @@
           <a:lstStyle/>
           <a:p>
             <a:r>
-              <a:rPr lang="en-US" b="1" dirty="0"/>
+              <a:rPr lang="en-US" dirty="0"/>
               <a:t>Code smell examples: Method level</a:t>
             </a:r>
-            <a:endParaRPr lang="en-US" dirty="0"/>
           </a:p>
         </p:txBody>
       </p:sp>
@@ -4123,19 +5619,19 @@
           <a:p>
             <a:r>
               <a:rPr lang="en-US" dirty="0"/>
-              <a:t>Excessively short identifiers: the name of a variable should reflect its function unless the function is obvious</a:t>
+              <a:t>Excessively short identifiers: The name of a variable should reflect its function unless the function is obvious.</a:t>
             </a:r>
           </a:p>
           <a:p>
             <a:r>
               <a:rPr lang="en-US" dirty="0"/>
-              <a:t>Excessive return of data: a function or method that returns more than what each of its callers needs</a:t>
+              <a:t>Excessive return of data: A function or method that returns more than what each of its callers needs.</a:t>
             </a:r>
           </a:p>
           <a:p>
             <a:r>
               <a:rPr lang="en-US" dirty="0"/>
-              <a:t>Excessively long line of code (or God Line): A line of code which is too long, making the code difficult to read, understand, debug, refactor, or even identify possibilities of software reuse</a:t>
+              <a:t>Excessively long line of code (or God Line): A line of code which is too long, making the code difficult to read, understand, debug, refactor, or even identify possibilities of software reuse.</a:t>
             </a:r>
           </a:p>
           <a:p>
@@ -4156,6 +5652,198 @@
   <p:clrMapOvr>
     <a:masterClrMapping/>
   </p:clrMapOvr>
+  <mc:AlternateContent xmlns:mc="http://schemas.openxmlformats.org/markup-compatibility/2006">
+    <mc:Choice xmlns:p14="http://schemas.microsoft.com/office/powerpoint/2010/main" Requires="p14">
+      <p:transition spd="med" p14:dur="700">
+        <p:fade/>
+      </p:transition>
+    </mc:Choice>
+    <mc:Fallback>
+      <p:transition spd="med">
+        <p:fade/>
+      </p:transition>
+    </mc:Fallback>
+  </mc:AlternateContent>
+  <p:timing>
+    <p:tnLst>
+      <p:par>
+        <p:cTn id="1" dur="indefinite" restart="never" nodeType="tmRoot">
+          <p:childTnLst>
+            <p:seq concurrent="1" nextAc="seek">
+              <p:cTn id="2" dur="indefinite" nodeType="mainSeq">
+                <p:childTnLst>
+                  <p:par>
+                    <p:cTn id="3" fill="hold">
+                      <p:stCondLst>
+                        <p:cond delay="indefinite"/>
+                      </p:stCondLst>
+                      <p:childTnLst>
+                        <p:par>
+                          <p:cTn id="4" fill="hold">
+                            <p:stCondLst>
+                              <p:cond delay="0"/>
+                            </p:stCondLst>
+                            <p:childTnLst>
+                              <p:par>
+                                <p:cTn id="5" presetID="1" presetClass="entr" presetSubtype="0" fill="hold" grpId="0" nodeType="clickEffect">
+                                  <p:stCondLst>
+                                    <p:cond delay="0"/>
+                                  </p:stCondLst>
+                                  <p:childTnLst>
+                                    <p:set>
+                                      <p:cBhvr>
+                                        <p:cTn id="6" dur="1" fill="hold">
+                                          <p:stCondLst>
+                                            <p:cond delay="0"/>
+                                          </p:stCondLst>
+                                        </p:cTn>
+                                        <p:tgtEl>
+                                          <p:spTgt spid="3">
+                                            <p:txEl>
+                                              <p:pRg st="0" end="0"/>
+                                            </p:txEl>
+                                          </p:spTgt>
+                                        </p:tgtEl>
+                                        <p:attrNameLst>
+                                          <p:attrName>style.visibility</p:attrName>
+                                        </p:attrNameLst>
+                                      </p:cBhvr>
+                                      <p:to>
+                                        <p:strVal val="visible"/>
+                                      </p:to>
+                                    </p:set>
+                                  </p:childTnLst>
+                                </p:cTn>
+                              </p:par>
+                            </p:childTnLst>
+                          </p:cTn>
+                        </p:par>
+                      </p:childTnLst>
+                    </p:cTn>
+                  </p:par>
+                  <p:par>
+                    <p:cTn id="7" fill="hold">
+                      <p:stCondLst>
+                        <p:cond delay="indefinite"/>
+                      </p:stCondLst>
+                      <p:childTnLst>
+                        <p:par>
+                          <p:cTn id="8" fill="hold">
+                            <p:stCondLst>
+                              <p:cond delay="0"/>
+                            </p:stCondLst>
+                            <p:childTnLst>
+                              <p:par>
+                                <p:cTn id="9" presetID="1" presetClass="entr" presetSubtype="0" fill="hold" grpId="0" nodeType="clickEffect">
+                                  <p:stCondLst>
+                                    <p:cond delay="0"/>
+                                  </p:stCondLst>
+                                  <p:childTnLst>
+                                    <p:set>
+                                      <p:cBhvr>
+                                        <p:cTn id="10" dur="1" fill="hold">
+                                          <p:stCondLst>
+                                            <p:cond delay="0"/>
+                                          </p:stCondLst>
+                                        </p:cTn>
+                                        <p:tgtEl>
+                                          <p:spTgt spid="3">
+                                            <p:txEl>
+                                              <p:pRg st="1" end="1"/>
+                                            </p:txEl>
+                                          </p:spTgt>
+                                        </p:tgtEl>
+                                        <p:attrNameLst>
+                                          <p:attrName>style.visibility</p:attrName>
+                                        </p:attrNameLst>
+                                      </p:cBhvr>
+                                      <p:to>
+                                        <p:strVal val="visible"/>
+                                      </p:to>
+                                    </p:set>
+                                  </p:childTnLst>
+                                </p:cTn>
+                              </p:par>
+                            </p:childTnLst>
+                          </p:cTn>
+                        </p:par>
+                      </p:childTnLst>
+                    </p:cTn>
+                  </p:par>
+                  <p:par>
+                    <p:cTn id="11" fill="hold">
+                      <p:stCondLst>
+                        <p:cond delay="indefinite"/>
+                      </p:stCondLst>
+                      <p:childTnLst>
+                        <p:par>
+                          <p:cTn id="12" fill="hold">
+                            <p:stCondLst>
+                              <p:cond delay="0"/>
+                            </p:stCondLst>
+                            <p:childTnLst>
+                              <p:par>
+                                <p:cTn id="13" presetID="1" presetClass="entr" presetSubtype="0" fill="hold" grpId="0" nodeType="clickEffect">
+                                  <p:stCondLst>
+                                    <p:cond delay="0"/>
+                                  </p:stCondLst>
+                                  <p:childTnLst>
+                                    <p:set>
+                                      <p:cBhvr>
+                                        <p:cTn id="14" dur="1" fill="hold">
+                                          <p:stCondLst>
+                                            <p:cond delay="0"/>
+                                          </p:stCondLst>
+                                        </p:cTn>
+                                        <p:tgtEl>
+                                          <p:spTgt spid="3">
+                                            <p:txEl>
+                                              <p:pRg st="2" end="2"/>
+                                            </p:txEl>
+                                          </p:spTgt>
+                                        </p:tgtEl>
+                                        <p:attrNameLst>
+                                          <p:attrName>style.visibility</p:attrName>
+                                        </p:attrNameLst>
+                                      </p:cBhvr>
+                                      <p:to>
+                                        <p:strVal val="visible"/>
+                                      </p:to>
+                                    </p:set>
+                                  </p:childTnLst>
+                                </p:cTn>
+                              </p:par>
+                            </p:childTnLst>
+                          </p:cTn>
+                        </p:par>
+                      </p:childTnLst>
+                    </p:cTn>
+                  </p:par>
+                </p:childTnLst>
+              </p:cTn>
+              <p:prevCondLst>
+                <p:cond evt="onPrev" delay="0">
+                  <p:tgtEl>
+                    <p:sldTgt/>
+                  </p:tgtEl>
+                </p:cond>
+              </p:prevCondLst>
+              <p:nextCondLst>
+                <p:cond evt="onNext" delay="0">
+                  <p:tgtEl>
+                    <p:sldTgt/>
+                  </p:tgtEl>
+                </p:cond>
+              </p:nextCondLst>
+            </p:seq>
+          </p:childTnLst>
+        </p:cTn>
+      </p:par>
+    </p:tnLst>
+    <p:bldLst>
+      <p:bldP spid="3" grpId="0" build="p"/>
+    </p:bldLst>
+  </p:timing>
 </p:sld>
 </file>
 
@@ -4198,7 +5886,7 @@
           <a:lstStyle/>
           <a:p>
             <a:r>
-              <a:rPr lang="en-US" b="1" dirty="0"/>
+              <a:rPr lang="en-US" dirty="0"/>
               <a:t>Code is a liability</a:t>
             </a:r>
           </a:p>
@@ -4260,6 +5948,247 @@
   <p:clrMapOvr>
     <a:masterClrMapping/>
   </p:clrMapOvr>
+  <mc:AlternateContent xmlns:mc="http://schemas.openxmlformats.org/markup-compatibility/2006">
+    <mc:Choice xmlns:p14="http://schemas.microsoft.com/office/powerpoint/2010/main" Requires="p14">
+      <p:transition spd="med" p14:dur="700">
+        <p:fade/>
+      </p:transition>
+    </mc:Choice>
+    <mc:Fallback>
+      <p:transition spd="med">
+        <p:fade/>
+      </p:transition>
+    </mc:Fallback>
+  </mc:AlternateContent>
+  <p:timing>
+    <p:tnLst>
+      <p:par>
+        <p:cTn id="1" dur="indefinite" restart="never" nodeType="tmRoot">
+          <p:childTnLst>
+            <p:seq concurrent="1" nextAc="seek">
+              <p:cTn id="2" dur="indefinite" nodeType="mainSeq">
+                <p:childTnLst>
+                  <p:par>
+                    <p:cTn id="3" fill="hold">
+                      <p:stCondLst>
+                        <p:cond delay="indefinite"/>
+                      </p:stCondLst>
+                      <p:childTnLst>
+                        <p:par>
+                          <p:cTn id="4" fill="hold">
+                            <p:stCondLst>
+                              <p:cond delay="0"/>
+                            </p:stCondLst>
+                            <p:childTnLst>
+                              <p:par>
+                                <p:cTn id="5" presetID="1" presetClass="entr" presetSubtype="0" fill="hold" grpId="0" nodeType="clickEffect">
+                                  <p:stCondLst>
+                                    <p:cond delay="0"/>
+                                  </p:stCondLst>
+                                  <p:childTnLst>
+                                    <p:set>
+                                      <p:cBhvr>
+                                        <p:cTn id="6" dur="1" fill="hold">
+                                          <p:stCondLst>
+                                            <p:cond delay="0"/>
+                                          </p:stCondLst>
+                                        </p:cTn>
+                                        <p:tgtEl>
+                                          <p:spTgt spid="3">
+                                            <p:txEl>
+                                              <p:pRg st="0" end="0"/>
+                                            </p:txEl>
+                                          </p:spTgt>
+                                        </p:tgtEl>
+                                        <p:attrNameLst>
+                                          <p:attrName>style.visibility</p:attrName>
+                                        </p:attrNameLst>
+                                      </p:cBhvr>
+                                      <p:to>
+                                        <p:strVal val="visible"/>
+                                      </p:to>
+                                    </p:set>
+                                  </p:childTnLst>
+                                </p:cTn>
+                              </p:par>
+                            </p:childTnLst>
+                          </p:cTn>
+                        </p:par>
+                      </p:childTnLst>
+                    </p:cTn>
+                  </p:par>
+                  <p:par>
+                    <p:cTn id="7" fill="hold">
+                      <p:stCondLst>
+                        <p:cond delay="indefinite"/>
+                      </p:stCondLst>
+                      <p:childTnLst>
+                        <p:par>
+                          <p:cTn id="8" fill="hold">
+                            <p:stCondLst>
+                              <p:cond delay="0"/>
+                            </p:stCondLst>
+                            <p:childTnLst>
+                              <p:par>
+                                <p:cTn id="9" presetID="1" presetClass="entr" presetSubtype="0" fill="hold" grpId="0" nodeType="clickEffect">
+                                  <p:stCondLst>
+                                    <p:cond delay="0"/>
+                                  </p:stCondLst>
+                                  <p:childTnLst>
+                                    <p:set>
+                                      <p:cBhvr>
+                                        <p:cTn id="10" dur="1" fill="hold">
+                                          <p:stCondLst>
+                                            <p:cond delay="0"/>
+                                          </p:stCondLst>
+                                        </p:cTn>
+                                        <p:tgtEl>
+                                          <p:spTgt spid="3">
+                                            <p:txEl>
+                                              <p:pRg st="1" end="1"/>
+                                            </p:txEl>
+                                          </p:spTgt>
+                                        </p:tgtEl>
+                                        <p:attrNameLst>
+                                          <p:attrName>style.visibility</p:attrName>
+                                        </p:attrNameLst>
+                                      </p:cBhvr>
+                                      <p:to>
+                                        <p:strVal val="visible"/>
+                                      </p:to>
+                                    </p:set>
+                                  </p:childTnLst>
+                                </p:cTn>
+                              </p:par>
+                            </p:childTnLst>
+                          </p:cTn>
+                        </p:par>
+                      </p:childTnLst>
+                    </p:cTn>
+                  </p:par>
+                  <p:par>
+                    <p:cTn id="11" fill="hold">
+                      <p:stCondLst>
+                        <p:cond delay="indefinite"/>
+                      </p:stCondLst>
+                      <p:childTnLst>
+                        <p:par>
+                          <p:cTn id="12" fill="hold">
+                            <p:stCondLst>
+                              <p:cond delay="0"/>
+                            </p:stCondLst>
+                            <p:childTnLst>
+                              <p:par>
+                                <p:cTn id="13" presetID="1" presetClass="entr" presetSubtype="0" fill="hold" grpId="0" nodeType="clickEffect">
+                                  <p:stCondLst>
+                                    <p:cond delay="0"/>
+                                  </p:stCondLst>
+                                  <p:childTnLst>
+                                    <p:set>
+                                      <p:cBhvr>
+                                        <p:cTn id="14" dur="1" fill="hold">
+                                          <p:stCondLst>
+                                            <p:cond delay="0"/>
+                                          </p:stCondLst>
+                                        </p:cTn>
+                                        <p:tgtEl>
+                                          <p:spTgt spid="3">
+                                            <p:txEl>
+                                              <p:pRg st="2" end="2"/>
+                                            </p:txEl>
+                                          </p:spTgt>
+                                        </p:tgtEl>
+                                        <p:attrNameLst>
+                                          <p:attrName>style.visibility</p:attrName>
+                                        </p:attrNameLst>
+                                      </p:cBhvr>
+                                      <p:to>
+                                        <p:strVal val="visible"/>
+                                      </p:to>
+                                    </p:set>
+                                  </p:childTnLst>
+                                </p:cTn>
+                              </p:par>
+                            </p:childTnLst>
+                          </p:cTn>
+                        </p:par>
+                      </p:childTnLst>
+                    </p:cTn>
+                  </p:par>
+                  <p:par>
+                    <p:cTn id="15" fill="hold">
+                      <p:stCondLst>
+                        <p:cond delay="indefinite"/>
+                      </p:stCondLst>
+                      <p:childTnLst>
+                        <p:par>
+                          <p:cTn id="16" fill="hold">
+                            <p:stCondLst>
+                              <p:cond delay="0"/>
+                            </p:stCondLst>
+                            <p:childTnLst>
+                              <p:par>
+                                <p:cTn id="17" presetID="1" presetClass="entr" presetSubtype="0" fill="hold" grpId="0" nodeType="clickEffect">
+                                  <p:stCondLst>
+                                    <p:cond delay="0"/>
+                                  </p:stCondLst>
+                                  <p:childTnLst>
+                                    <p:set>
+                                      <p:cBhvr>
+                                        <p:cTn id="18" dur="1" fill="hold">
+                                          <p:stCondLst>
+                                            <p:cond delay="0"/>
+                                          </p:stCondLst>
+                                        </p:cTn>
+                                        <p:tgtEl>
+                                          <p:spTgt spid="3">
+                                            <p:txEl>
+                                              <p:pRg st="3" end="3"/>
+                                            </p:txEl>
+                                          </p:spTgt>
+                                        </p:tgtEl>
+                                        <p:attrNameLst>
+                                          <p:attrName>style.visibility</p:attrName>
+                                        </p:attrNameLst>
+                                      </p:cBhvr>
+                                      <p:to>
+                                        <p:strVal val="visible"/>
+                                      </p:to>
+                                    </p:set>
+                                  </p:childTnLst>
+                                </p:cTn>
+                              </p:par>
+                            </p:childTnLst>
+                          </p:cTn>
+                        </p:par>
+                      </p:childTnLst>
+                    </p:cTn>
+                  </p:par>
+                </p:childTnLst>
+              </p:cTn>
+              <p:prevCondLst>
+                <p:cond evt="onPrev" delay="0">
+                  <p:tgtEl>
+                    <p:sldTgt/>
+                  </p:tgtEl>
+                </p:cond>
+              </p:prevCondLst>
+              <p:nextCondLst>
+                <p:cond evt="onNext" delay="0">
+                  <p:tgtEl>
+                    <p:sldTgt/>
+                  </p:tgtEl>
+                </p:cond>
+              </p:nextCondLst>
+            </p:seq>
+          </p:childTnLst>
+        </p:cTn>
+      </p:par>
+    </p:tnLst>
+    <p:bldLst>
+      <p:bldP spid="3" grpId="0" build="p"/>
+    </p:bldLst>
+  </p:timing>
 </p:sld>
 </file>
 

</xml_diff>